<commit_message>
cleaned up flow, added presentation activities, standardized ppt templates
</commit_message>
<xml_diff>
--- a/templates/Crunchbase_PrivateCompanyOverview_Template.pptx
+++ b/templates/Crunchbase_PrivateCompanyOverview_Template.pptx
@@ -5205,7 +5205,7 @@
       </p:sp>
       <p:sp>
         <p:nvSpPr>
-          <p:cNvPr id="4" name="Rectangle 3">
+          <p:cNvPr id="4" name="companyLogo">
             <a:extLst>
               <a:ext uri="{FF2B5EF4-FFF2-40B4-BE49-F238E27FC236}">
                 <a16:creationId xmlns:a16="http://schemas.microsoft.com/office/drawing/2014/main" id="{1DEF039A-FBAE-425B-BC37-CC65785BB3F3}"/>
@@ -5262,7 +5262,7 @@
       </p:sp>
       <p:graphicFrame>
         <p:nvGraphicFramePr>
-          <p:cNvPr id="5" name="Chart 4">
+          <p:cNvPr id="5" name="stockChart">
             <a:extLst>
               <a:ext uri="{FF2B5EF4-FFF2-40B4-BE49-F238E27FC236}">
                 <a16:creationId xmlns:a16="http://schemas.microsoft.com/office/drawing/2014/main" id="{36395124-2516-4C2B-AAB5-48ECD19D6171}"/>
@@ -5275,7 +5275,7 @@
           <p:nvPr>
             <p:extLst>
               <p:ext uri="{D42A27DB-BD31-4B8C-83A1-F6EECF244321}">
-                <p14:modId xmlns:p14="http://schemas.microsoft.com/office/powerpoint/2010/main" val="2940409011"/>
+                <p14:modId xmlns:p14="http://schemas.microsoft.com/office/powerpoint/2010/main" val="2194686274"/>
               </p:ext>
             </p:extLst>
           </p:nvPr>
@@ -5527,7 +5527,7 @@
           <p:nvPr>
             <p:extLst>
               <p:ext uri="{D42A27DB-BD31-4B8C-83A1-F6EECF244321}">
-                <p14:modId xmlns:p14="http://schemas.microsoft.com/office/powerpoint/2010/main" val="2750925918"/>
+                <p14:modId xmlns:p14="http://schemas.microsoft.com/office/powerpoint/2010/main" val="1694165687"/>
               </p:ext>
             </p:extLst>
           </p:nvPr>
@@ -6026,11 +6026,14 @@
                     <a:bodyPr/>
                     <a:lstStyle/>
                     <a:p>
-                      <a:endParaRPr lang="en-US" sz="1400" dirty="0">
-                        <a:solidFill>
-                          <a:schemeClr val="tx1"/>
-                        </a:solidFill>
-                      </a:endParaRPr>
+                      <a:r>
+                        <a:rPr lang="en-US" sz="1400" dirty="0">
+                          <a:solidFill>
+                            <a:schemeClr val="tx1"/>
+                          </a:solidFill>
+                        </a:rPr>
+                        <a:t>&lt;HQ Location&gt;</a:t>
+                      </a:r>
                     </a:p>
                   </a:txBody>
                   <a:tcPr anchor="ctr">
@@ -6164,6 +6167,14 @@
                     <a:bodyPr/>
                     <a:lstStyle/>
                     <a:p>
+                      <a:r>
+                        <a:rPr lang="en-US" sz="1400">
+                          <a:solidFill>
+                            <a:schemeClr val="tx1"/>
+                          </a:solidFill>
+                        </a:rPr>
+                        <a:t>&lt;Investors&gt;</a:t>
+                      </a:r>
                       <a:endParaRPr lang="en-US" sz="1400" dirty="0">
                         <a:solidFill>
                           <a:schemeClr val="tx1"/>

</xml_diff>